<commit_message>
cleaned up sample xml by removing resultcode
</commit_message>
<xml_diff>
--- a/ServiceInteractions/riv/clinicalprocess/healthcond/description/trunk/docs/TD_clinicalprocess_healthcond_description.pptx
+++ b/ServiceInteractions/riv/clinicalprocess/healthcond/description/trunk/docs/TD_clinicalprocess_healthcond_description.pptx
@@ -205,7 +205,7 @@
             <a:fld id="{A1CCCE65-3320-6145-9FE0-1D4F0AE2F80D}" type="datetimeFigureOut">
               <a:rPr lang="sv-SE" smtClean="0"/>
               <a:pPr/>
-              <a:t>2013-03-05</a:t>
+              <a:t>2013-03-17</a:t>
             </a:fld>
             <a:endParaRPr lang="sv-SE"/>
           </a:p>
@@ -372,7 +372,7 @@
             <a:fld id="{48064D6E-32A5-4333-B2C8-253366DFFB1E}" type="datetimeFigureOut">
               <a:rPr lang="sv-SE" smtClean="0"/>
               <a:pPr/>
-              <a:t>2013-03-05</a:t>
+              <a:t>2013-03-17</a:t>
             </a:fld>
             <a:endParaRPr lang="sv-SE"/>
           </a:p>
@@ -809,7 +809,7 @@
             <a:fld id="{793AEFA7-59BA-446D-B708-A2D615D75329}" type="datetimeFigureOut">
               <a:rPr lang="sv-SE" smtClean="0"/>
               <a:pPr defTabSz="895350"/>
-              <a:t>2013-03-05</a:t>
+              <a:t>2013-03-17</a:t>
             </a:fld>
             <a:r>
               <a:rPr lang="sv-SE" dirty="0" smtClean="0"/>
@@ -1284,7 +1284,7 @@
             <a:fld id="{793AEFA7-59BA-446D-B708-A2D615D75329}" type="datetimeFigureOut">
               <a:rPr lang="sv-SE" smtClean="0"/>
               <a:pPr defTabSz="895350"/>
-              <a:t>2013-03-05</a:t>
+              <a:t>2013-03-17</a:t>
             </a:fld>
             <a:r>
               <a:rPr lang="sv-SE" dirty="0" smtClean="0"/>
@@ -1742,7 +1742,7 @@
             <a:fld id="{793AEFA7-59BA-446D-B708-A2D615D75329}" type="datetimeFigureOut">
               <a:rPr lang="sv-SE" smtClean="0"/>
               <a:pPr defTabSz="895350"/>
-              <a:t>2013-03-05</a:t>
+              <a:t>2013-03-17</a:t>
             </a:fld>
             <a:r>
               <a:rPr lang="sv-SE" dirty="0" smtClean="0"/>
@@ -1951,7 +1951,7 @@
             <a:fld id="{793AEFA7-59BA-446D-B708-A2D615D75329}" type="datetimeFigureOut">
               <a:rPr lang="sv-SE" smtClean="0"/>
               <a:pPr defTabSz="895350"/>
-              <a:t>2013-03-05</a:t>
+              <a:t>2013-03-17</a:t>
             </a:fld>
             <a:r>
               <a:rPr lang="sv-SE" dirty="0" smtClean="0"/>
@@ -2179,7 +2179,7 @@
             <a:fld id="{793AEFA7-59BA-446D-B708-A2D615D75329}" type="datetimeFigureOut">
               <a:rPr lang="sv-SE" smtClean="0"/>
               <a:pPr defTabSz="895350"/>
-              <a:t>2013-03-05</a:t>
+              <a:t>2013-03-17</a:t>
             </a:fld>
             <a:r>
               <a:rPr lang="sv-SE" dirty="0" smtClean="0"/>
@@ -2574,7 +2574,7 @@
             <a:fld id="{793AEFA7-59BA-446D-B708-A2D615D75329}" type="datetimeFigureOut">
               <a:rPr lang="sv-SE" smtClean="0"/>
               <a:pPr defTabSz="895350"/>
-              <a:t>2013-03-05</a:t>
+              <a:t>2013-03-17</a:t>
             </a:fld>
             <a:r>
               <a:rPr lang="sv-SE" dirty="0" smtClean="0"/>
@@ -3057,7 +3057,7 @@
             <a:fld id="{793AEFA7-59BA-446D-B708-A2D615D75329}" type="datetimeFigureOut">
               <a:rPr lang="sv-SE" smtClean="0"/>
               <a:pPr/>
-              <a:t>2013-03-05</a:t>
+              <a:t>2013-03-17</a:t>
             </a:fld>
             <a:endParaRPr lang="sv-SE" dirty="0"/>
           </a:p>
@@ -3567,7 +3567,7 @@
             <a:fld id="{1557CB54-6EE6-4E9A-A5F4-26576EC193CD}" type="datetimeFigureOut">
               <a:rPr lang="sv-SE" smtClean="0"/>
               <a:pPr/>
-              <a:t>2013-03-05</a:t>
+              <a:t>2013-03-17</a:t>
             </a:fld>
             <a:endParaRPr lang="sv-SE"/>
           </a:p>
@@ -3986,10 +3986,10 @@
               </a:rPr>
             </a:br>
             <a:r>
-              <a:rPr lang="sv-SE" b="1" dirty="0" err="1" smtClean="0">
+              <a:rPr lang="sv-SE" b="1" smtClean="0">
                 <a:latin typeface="Verdana" charset="0"/>
               </a:rPr>
-              <a:t>ehr_patientsummary</a:t>
+              <a:t>clinicalprocess:healthcond:description</a:t>
             </a:r>
             <a:endParaRPr lang="sv-SE" dirty="0">
               <a:latin typeface="Verdana" charset="0"/>
@@ -11838,7 +11838,7 @@
             <a:fld id="{793AEFA7-59BA-446D-B708-A2D615D75329}" type="datetimeFigureOut">
               <a:rPr lang="sv-SE" smtClean="0"/>
               <a:pPr defTabSz="895350"/>
-              <a:t>2013-03-05</a:t>
+              <a:t>2013-03-17</a:t>
             </a:fld>
             <a:r>
               <a:rPr lang="sv-SE" smtClean="0"/>
@@ -14313,7 +14313,7 @@
             <a:fld id="{793AEFA7-59BA-446D-B708-A2D615D75329}" type="datetimeFigureOut">
               <a:rPr lang="sv-SE" smtClean="0"/>
               <a:pPr defTabSz="895350"/>
-              <a:t>2013-03-05</a:t>
+              <a:t>2013-03-17</a:t>
             </a:fld>
             <a:r>
               <a:rPr lang="sv-SE" smtClean="0"/>
@@ -16115,7 +16115,7 @@
             <a:fld id="{793AEFA7-59BA-446D-B708-A2D615D75329}" type="datetimeFigureOut">
               <a:rPr lang="sv-SE" smtClean="0"/>
               <a:pPr defTabSz="895350"/>
-              <a:t>2013-03-05</a:t>
+              <a:t>2013-03-17</a:t>
             </a:fld>
             <a:r>
               <a:rPr lang="sv-SE" smtClean="0"/>
@@ -18509,7 +18509,7 @@
             <a:fld id="{793AEFA7-59BA-446D-B708-A2D615D75329}" type="datetimeFigureOut">
               <a:rPr lang="sv-SE" smtClean="0"/>
               <a:pPr defTabSz="895350"/>
-              <a:t>2013-03-05</a:t>
+              <a:t>2013-03-17</a:t>
             </a:fld>
             <a:r>
               <a:rPr lang="sv-SE" smtClean="0"/>

</xml_diff>

<commit_message>
fixed the docs for logical address
</commit_message>
<xml_diff>
--- a/ServiceInteractions/riv/clinicalprocess/healthcond/description/trunk/docs/TD_clinicalprocess_healthcond_description.pptx
+++ b/ServiceInteractions/riv/clinicalprocess/healthcond/description/trunk/docs/TD_clinicalprocess_healthcond_description.pptx
@@ -6,10 +6,10 @@
     <p:sldMasterId id="2147483670" r:id="rId2"/>
   </p:sldMasterIdLst>
   <p:notesMasterIdLst>
-    <p:notesMasterId r:id="rId12"/>
+    <p:notesMasterId r:id="rId13"/>
   </p:notesMasterIdLst>
   <p:handoutMasterIdLst>
-    <p:handoutMasterId r:id="rId13"/>
+    <p:handoutMasterId r:id="rId14"/>
   </p:handoutMasterIdLst>
   <p:sldIdLst>
     <p:sldId id="324" r:id="rId3"/>
@@ -21,6 +21,7 @@
     <p:sldId id="330" r:id="rId9"/>
     <p:sldId id="331" r:id="rId10"/>
     <p:sldId id="332" r:id="rId11"/>
+    <p:sldId id="334" r:id="rId12"/>
   </p:sldIdLst>
   <p:sldSz cx="9144000" cy="6858000" type="screen4x3"/>
   <p:notesSz cx="6858000" cy="9144000"/>
@@ -205,7 +206,7 @@
             <a:fld id="{A1CCCE65-3320-6145-9FE0-1D4F0AE2F80D}" type="datetimeFigureOut">
               <a:rPr lang="sv-SE" smtClean="0"/>
               <a:pPr/>
-              <a:t>2013-03-17</a:t>
+              <a:t>2013-04-08</a:t>
             </a:fld>
             <a:endParaRPr lang="sv-SE"/>
           </a:p>
@@ -372,7 +373,7 @@
             <a:fld id="{48064D6E-32A5-4333-B2C8-253366DFFB1E}" type="datetimeFigureOut">
               <a:rPr lang="sv-SE" smtClean="0"/>
               <a:pPr/>
-              <a:t>2013-03-17</a:t>
+              <a:t>2013-04-08</a:t>
             </a:fld>
             <a:endParaRPr lang="sv-SE"/>
           </a:p>
@@ -809,7 +810,7 @@
             <a:fld id="{793AEFA7-59BA-446D-B708-A2D615D75329}" type="datetimeFigureOut">
               <a:rPr lang="sv-SE" smtClean="0"/>
               <a:pPr defTabSz="895350"/>
-              <a:t>2013-03-17</a:t>
+              <a:t>2013-04-08</a:t>
             </a:fld>
             <a:r>
               <a:rPr lang="sv-SE" dirty="0" smtClean="0"/>
@@ -1284,7 +1285,7 @@
             <a:fld id="{793AEFA7-59BA-446D-B708-A2D615D75329}" type="datetimeFigureOut">
               <a:rPr lang="sv-SE" smtClean="0"/>
               <a:pPr defTabSz="895350"/>
-              <a:t>2013-03-17</a:t>
+              <a:t>2013-04-08</a:t>
             </a:fld>
             <a:r>
               <a:rPr lang="sv-SE" dirty="0" smtClean="0"/>
@@ -1742,7 +1743,7 @@
             <a:fld id="{793AEFA7-59BA-446D-B708-A2D615D75329}" type="datetimeFigureOut">
               <a:rPr lang="sv-SE" smtClean="0"/>
               <a:pPr defTabSz="895350"/>
-              <a:t>2013-03-17</a:t>
+              <a:t>2013-04-08</a:t>
             </a:fld>
             <a:r>
               <a:rPr lang="sv-SE" dirty="0" smtClean="0"/>
@@ -1951,7 +1952,7 @@
             <a:fld id="{793AEFA7-59BA-446D-B708-A2D615D75329}" type="datetimeFigureOut">
               <a:rPr lang="sv-SE" smtClean="0"/>
               <a:pPr defTabSz="895350"/>
-              <a:t>2013-03-17</a:t>
+              <a:t>2013-04-08</a:t>
             </a:fld>
             <a:r>
               <a:rPr lang="sv-SE" dirty="0" smtClean="0"/>
@@ -2179,7 +2180,7 @@
             <a:fld id="{793AEFA7-59BA-446D-B708-A2D615D75329}" type="datetimeFigureOut">
               <a:rPr lang="sv-SE" smtClean="0"/>
               <a:pPr defTabSz="895350"/>
-              <a:t>2013-03-17</a:t>
+              <a:t>2013-04-08</a:t>
             </a:fld>
             <a:r>
               <a:rPr lang="sv-SE" dirty="0" smtClean="0"/>
@@ -2574,7 +2575,7 @@
             <a:fld id="{793AEFA7-59BA-446D-B708-A2D615D75329}" type="datetimeFigureOut">
               <a:rPr lang="sv-SE" smtClean="0"/>
               <a:pPr defTabSz="895350"/>
-              <a:t>2013-03-17</a:t>
+              <a:t>2013-04-08</a:t>
             </a:fld>
             <a:r>
               <a:rPr lang="sv-SE" dirty="0" smtClean="0"/>
@@ -3057,7 +3058,7 @@
             <a:fld id="{793AEFA7-59BA-446D-B708-A2D615D75329}" type="datetimeFigureOut">
               <a:rPr lang="sv-SE" smtClean="0"/>
               <a:pPr/>
-              <a:t>2013-03-17</a:t>
+              <a:t>2013-04-08</a:t>
             </a:fld>
             <a:endParaRPr lang="sv-SE" dirty="0"/>
           </a:p>
@@ -3567,7 +3568,7 @@
             <a:fld id="{1557CB54-6EE6-4E9A-A5F4-26576EC193CD}" type="datetimeFigureOut">
               <a:rPr lang="sv-SE" smtClean="0"/>
               <a:pPr/>
-              <a:t>2013-03-17</a:t>
+              <a:t>2013-04-08</a:t>
             </a:fld>
             <a:endParaRPr lang="sv-SE"/>
           </a:p>
@@ -4074,6 +4075,1736 @@
 </p:sld>
 </file>
 
+<file path=ppt/slides/slide10.xml><?xml version="1.0" encoding="utf-8"?>
+<p:sld xmlns:a="http://schemas.openxmlformats.org/drawingml/2006/main" xmlns:r="http://schemas.openxmlformats.org/officeDocument/2006/relationships" xmlns:p="http://schemas.openxmlformats.org/presentationml/2006/main">
+  <p:cSld>
+    <p:spTree>
+      <p:nvGrpSpPr>
+        <p:cNvPr id="1" name=""/>
+        <p:cNvGrpSpPr/>
+        <p:nvPr/>
+      </p:nvGrpSpPr>
+      <p:grpSpPr>
+        <a:xfrm>
+          <a:off x="0" y="0"/>
+          <a:ext cx="0" cy="0"/>
+          <a:chOff x="0" y="0"/>
+          <a:chExt cx="0" cy="0"/>
+        </a:xfrm>
+      </p:grpSpPr>
+      <p:sp>
+        <p:nvSpPr>
+          <p:cNvPr id="2" name="Rubrik 1"/>
+          <p:cNvSpPr>
+            <a:spLocks noGrp="1"/>
+          </p:cNvSpPr>
+          <p:nvPr>
+            <p:ph type="title"/>
+          </p:nvPr>
+        </p:nvSpPr>
+        <p:spPr>
+          <a:xfrm>
+            <a:off x="971600" y="476672"/>
+            <a:ext cx="7643866" cy="774720"/>
+          </a:xfrm>
+        </p:spPr>
+        <p:txBody>
+          <a:bodyPr/>
+          <a:lstStyle/>
+          <a:p>
+            <a:r>
+              <a:rPr lang="en-GB" dirty="0" err="1" smtClean="0"/>
+              <a:t>Nationell</a:t>
+            </a:r>
+            <a:r>
+              <a:rPr lang="en-GB" dirty="0" smtClean="0"/>
+              <a:t> </a:t>
+            </a:r>
+            <a:r>
+              <a:rPr lang="en-GB" dirty="0" err="1" smtClean="0"/>
+              <a:t>adressering</a:t>
+            </a:r>
+            <a:r>
+              <a:rPr lang="en-GB" dirty="0" smtClean="0"/>
+              <a:t> vid </a:t>
+            </a:r>
+            <a:r>
+              <a:rPr lang="en-GB" dirty="0" err="1" smtClean="0"/>
+              <a:t>sökning</a:t>
+            </a:r>
+            <a:r>
+              <a:rPr lang="en-GB" dirty="0" smtClean="0"/>
+              <a:t> </a:t>
+            </a:r>
+            <a:r>
+              <a:rPr lang="en-GB" dirty="0" err="1" smtClean="0"/>
+              <a:t>i</a:t>
+            </a:r>
+            <a:r>
+              <a:rPr lang="en-GB" dirty="0" smtClean="0"/>
+              <a:t> </a:t>
+            </a:r>
+            <a:r>
+              <a:rPr lang="en-GB" dirty="0" err="1" smtClean="0"/>
+              <a:t>specifikt</a:t>
+            </a:r>
+            <a:r>
+              <a:rPr lang="en-GB" dirty="0" smtClean="0"/>
+              <a:t> system</a:t>
+            </a:r>
+            <a:endParaRPr lang="en-GB" dirty="0"/>
+          </a:p>
+        </p:txBody>
+      </p:sp>
+      <p:sp>
+        <p:nvSpPr>
+          <p:cNvPr id="4" name="Platshållare för bildnummer 3"/>
+          <p:cNvSpPr>
+            <a:spLocks noGrp="1"/>
+          </p:cNvSpPr>
+          <p:nvPr>
+            <p:ph type="sldNum" sz="quarter" idx="12"/>
+          </p:nvPr>
+        </p:nvSpPr>
+        <p:spPr/>
+        <p:txBody>
+          <a:bodyPr/>
+          <a:lstStyle/>
+          <a:p>
+            <a:pPr defTabSz="895350"/>
+            <a:fld id="{793AEFA7-59BA-446D-B708-A2D615D75329}" type="datetimeFigureOut">
+              <a:rPr lang="sv-SE" smtClean="0"/>
+              <a:pPr defTabSz="895350"/>
+              <a:t>2013-04-08</a:t>
+            </a:fld>
+            <a:r>
+              <a:rPr lang="sv-SE" smtClean="0"/>
+              <a:t>     sid </a:t>
+            </a:r>
+            <a:fld id="{8BB3268F-30C5-4CD2-9024-B4739203B4BF}" type="slidenum">
+              <a:rPr lang="sv-SE" smtClean="0"/>
+              <a:pPr defTabSz="895350"/>
+              <a:t>10</a:t>
+            </a:fld>
+            <a:endParaRPr lang="sv-SE" dirty="0"/>
+          </a:p>
+        </p:txBody>
+      </p:sp>
+      <p:sp>
+        <p:nvSpPr>
+          <p:cNvPr id="5" name="Rektangel 4"/>
+          <p:cNvSpPr/>
+          <p:nvPr/>
+        </p:nvSpPr>
+        <p:spPr>
+          <a:xfrm>
+            <a:off x="1216584" y="5445224"/>
+            <a:ext cx="1224136" cy="576064"/>
+          </a:xfrm>
+          <a:prstGeom prst="rect">
+            <a:avLst/>
+          </a:prstGeom>
+        </p:spPr>
+        <p:style>
+          <a:lnRef idx="1">
+            <a:schemeClr val="accent1"/>
+          </a:lnRef>
+          <a:fillRef idx="3">
+            <a:schemeClr val="accent1"/>
+          </a:fillRef>
+          <a:effectRef idx="2">
+            <a:schemeClr val="accent1"/>
+          </a:effectRef>
+          <a:fontRef idx="minor">
+            <a:schemeClr val="lt1"/>
+          </a:fontRef>
+        </p:style>
+        <p:txBody>
+          <a:bodyPr rtlCol="0" anchor="ctr"/>
+          <a:lstStyle/>
+          <a:p>
+            <a:pPr algn="ctr"/>
+            <a:r>
+              <a:rPr lang="en-GB" sz="1400" dirty="0" err="1"/>
+              <a:t>V</a:t>
+            </a:r>
+            <a:r>
+              <a:rPr lang="en-GB" sz="1400" dirty="0" err="1" smtClean="0"/>
+              <a:t>årdsystem</a:t>
+            </a:r>
+            <a:endParaRPr lang="en-GB" sz="1400" dirty="0"/>
+          </a:p>
+        </p:txBody>
+      </p:sp>
+      <p:sp>
+        <p:nvSpPr>
+          <p:cNvPr id="6" name="Rektangel 5"/>
+          <p:cNvSpPr/>
+          <p:nvPr/>
+        </p:nvSpPr>
+        <p:spPr>
+          <a:xfrm>
+            <a:off x="2512728" y="5445224"/>
+            <a:ext cx="1224136" cy="576064"/>
+          </a:xfrm>
+          <a:prstGeom prst="rect">
+            <a:avLst/>
+          </a:prstGeom>
+        </p:spPr>
+        <p:style>
+          <a:lnRef idx="1">
+            <a:schemeClr val="accent1"/>
+          </a:lnRef>
+          <a:fillRef idx="3">
+            <a:schemeClr val="accent1"/>
+          </a:fillRef>
+          <a:effectRef idx="2">
+            <a:schemeClr val="accent1"/>
+          </a:effectRef>
+          <a:fontRef idx="minor">
+            <a:schemeClr val="lt1"/>
+          </a:fontRef>
+        </p:style>
+        <p:txBody>
+          <a:bodyPr rtlCol="0" anchor="ctr"/>
+          <a:lstStyle/>
+          <a:p>
+            <a:pPr algn="ctr"/>
+            <a:r>
+              <a:rPr lang="en-GB" sz="1400" dirty="0" err="1" smtClean="0"/>
+              <a:t>Vårdsystem</a:t>
+            </a:r>
+            <a:endParaRPr lang="en-GB" sz="1400" dirty="0" smtClean="0"/>
+          </a:p>
+          <a:p>
+            <a:pPr algn="ctr"/>
+            <a:r>
+              <a:rPr lang="en-GB" sz="1400" dirty="0" smtClean="0"/>
+              <a:t>“KS123”</a:t>
+            </a:r>
+            <a:endParaRPr lang="en-GB" sz="1400" dirty="0"/>
+          </a:p>
+        </p:txBody>
+      </p:sp>
+      <p:sp>
+        <p:nvSpPr>
+          <p:cNvPr id="10" name="Rektangel 9"/>
+          <p:cNvSpPr/>
+          <p:nvPr/>
+        </p:nvSpPr>
+        <p:spPr>
+          <a:xfrm>
+            <a:off x="1216584" y="4725144"/>
+            <a:ext cx="2520280" cy="576064"/>
+          </a:xfrm>
+          <a:prstGeom prst="rect">
+            <a:avLst/>
+          </a:prstGeom>
+        </p:spPr>
+        <p:style>
+          <a:lnRef idx="1">
+            <a:schemeClr val="accent1"/>
+          </a:lnRef>
+          <a:fillRef idx="3">
+            <a:schemeClr val="accent1"/>
+          </a:fillRef>
+          <a:effectRef idx="2">
+            <a:schemeClr val="accent1"/>
+          </a:effectRef>
+          <a:fontRef idx="minor">
+            <a:schemeClr val="lt1"/>
+          </a:fontRef>
+        </p:style>
+        <p:txBody>
+          <a:bodyPr rtlCol="0" anchor="ctr"/>
+          <a:lstStyle/>
+          <a:p>
+            <a:pPr algn="ctr"/>
+            <a:r>
+              <a:rPr lang="en-GB" sz="1400" dirty="0" err="1" smtClean="0"/>
+              <a:t>Mellanlager</a:t>
+            </a:r>
+            <a:endParaRPr lang="en-GB" sz="1400" dirty="0"/>
+          </a:p>
+        </p:txBody>
+      </p:sp>
+      <p:sp>
+        <p:nvSpPr>
+          <p:cNvPr id="12" name="Rektangel 11"/>
+          <p:cNvSpPr/>
+          <p:nvPr/>
+        </p:nvSpPr>
+        <p:spPr>
+          <a:xfrm>
+            <a:off x="1216584" y="4077072"/>
+            <a:ext cx="2520280" cy="576064"/>
+          </a:xfrm>
+          <a:prstGeom prst="rect">
+            <a:avLst/>
+          </a:prstGeom>
+        </p:spPr>
+        <p:style>
+          <a:lnRef idx="1">
+            <a:schemeClr val="accent1"/>
+          </a:lnRef>
+          <a:fillRef idx="3">
+            <a:schemeClr val="accent1"/>
+          </a:fillRef>
+          <a:effectRef idx="2">
+            <a:schemeClr val="accent1"/>
+          </a:effectRef>
+          <a:fontRef idx="minor">
+            <a:schemeClr val="lt1"/>
+          </a:fontRef>
+        </p:style>
+        <p:txBody>
+          <a:bodyPr rtlCol="0" anchor="t"/>
+          <a:lstStyle/>
+          <a:p>
+            <a:pPr algn="ctr"/>
+            <a:r>
+              <a:rPr lang="en-GB" sz="1400" dirty="0" smtClean="0"/>
+              <a:t>Regional </a:t>
+            </a:r>
+            <a:r>
+              <a:rPr lang="en-GB" sz="1400" dirty="0" err="1" smtClean="0"/>
+              <a:t>tjänsteplattform</a:t>
+            </a:r>
+            <a:endParaRPr lang="en-GB" sz="1400" dirty="0"/>
+          </a:p>
+        </p:txBody>
+      </p:sp>
+      <p:sp>
+        <p:nvSpPr>
+          <p:cNvPr id="14" name="Rektangel 13"/>
+          <p:cNvSpPr/>
+          <p:nvPr/>
+        </p:nvSpPr>
+        <p:spPr>
+          <a:xfrm>
+            <a:off x="1763688" y="2276872"/>
+            <a:ext cx="5616624" cy="936104"/>
+          </a:xfrm>
+          <a:prstGeom prst="rect">
+            <a:avLst/>
+          </a:prstGeom>
+        </p:spPr>
+        <p:style>
+          <a:lnRef idx="1">
+            <a:schemeClr val="accent1"/>
+          </a:lnRef>
+          <a:fillRef idx="3">
+            <a:schemeClr val="accent1"/>
+          </a:fillRef>
+          <a:effectRef idx="2">
+            <a:schemeClr val="accent1"/>
+          </a:effectRef>
+          <a:fontRef idx="minor">
+            <a:schemeClr val="lt1"/>
+          </a:fontRef>
+        </p:style>
+        <p:txBody>
+          <a:bodyPr rtlCol="0" anchor="t"/>
+          <a:lstStyle/>
+          <a:p>
+            <a:pPr algn="ctr"/>
+            <a:r>
+              <a:rPr lang="en-GB" sz="1400" dirty="0" err="1" smtClean="0"/>
+              <a:t>Gemensam</a:t>
+            </a:r>
+            <a:r>
+              <a:rPr lang="en-GB" sz="1400" dirty="0" smtClean="0"/>
+              <a:t> </a:t>
+            </a:r>
+            <a:r>
+              <a:rPr lang="en-GB" sz="1400" dirty="0" err="1" smtClean="0"/>
+              <a:t>tjänsteplattform</a:t>
+            </a:r>
+            <a:r>
+              <a:rPr lang="en-GB" sz="1400" dirty="0" smtClean="0"/>
+              <a:t> (</a:t>
+            </a:r>
+            <a:r>
+              <a:rPr lang="en-GB" sz="1400" dirty="0" err="1" smtClean="0"/>
+              <a:t>NTjP</a:t>
+            </a:r>
+            <a:r>
+              <a:rPr lang="en-GB" sz="1400" dirty="0" smtClean="0"/>
+              <a:t>)</a:t>
+            </a:r>
+            <a:endParaRPr lang="en-GB" sz="1400" dirty="0"/>
+          </a:p>
+        </p:txBody>
+      </p:sp>
+      <p:sp>
+        <p:nvSpPr>
+          <p:cNvPr id="15" name="Rektangel 14"/>
+          <p:cNvSpPr/>
+          <p:nvPr/>
+        </p:nvSpPr>
+        <p:spPr>
+          <a:xfrm>
+            <a:off x="1835696" y="1196752"/>
+            <a:ext cx="2448272" cy="576064"/>
+          </a:xfrm>
+          <a:prstGeom prst="rect">
+            <a:avLst/>
+          </a:prstGeom>
+        </p:spPr>
+        <p:style>
+          <a:lnRef idx="1">
+            <a:schemeClr val="accent1"/>
+          </a:lnRef>
+          <a:fillRef idx="3">
+            <a:schemeClr val="accent1"/>
+          </a:fillRef>
+          <a:effectRef idx="2">
+            <a:schemeClr val="accent1"/>
+          </a:effectRef>
+          <a:fontRef idx="minor">
+            <a:schemeClr val="lt1"/>
+          </a:fontRef>
+        </p:style>
+        <p:txBody>
+          <a:bodyPr rtlCol="0" anchor="ctr"/>
+          <a:lstStyle/>
+          <a:p>
+            <a:pPr algn="ctr"/>
+            <a:r>
+              <a:rPr lang="en-GB" sz="1400" dirty="0" err="1" smtClean="0"/>
+              <a:t>Nationell</a:t>
+            </a:r>
+            <a:r>
+              <a:rPr lang="en-GB" sz="1400" dirty="0" smtClean="0"/>
+              <a:t> </a:t>
+            </a:r>
+            <a:r>
+              <a:rPr lang="en-GB" sz="1400" dirty="0" err="1" smtClean="0"/>
+              <a:t>tjänstekonsument</a:t>
+            </a:r>
+            <a:endParaRPr lang="en-GB" sz="1400" dirty="0" smtClean="0"/>
+          </a:p>
+          <a:p>
+            <a:pPr algn="ctr"/>
+            <a:r>
+              <a:rPr lang="en-GB" sz="1400" dirty="0" err="1"/>
+              <a:t>f</a:t>
+            </a:r>
+            <a:r>
+              <a:rPr lang="en-GB" sz="1400" dirty="0" err="1" smtClean="0"/>
+              <a:t>ör</a:t>
+            </a:r>
+            <a:r>
+              <a:rPr lang="en-GB" sz="1400" dirty="0" smtClean="0"/>
+              <a:t> </a:t>
+            </a:r>
+            <a:r>
+              <a:rPr lang="en-GB" sz="1400" dirty="0" err="1" smtClean="0"/>
+              <a:t>invånare</a:t>
+            </a:r>
+            <a:endParaRPr lang="en-GB" sz="1400" dirty="0"/>
+          </a:p>
+        </p:txBody>
+      </p:sp>
+      <p:cxnSp>
+        <p:nvCxnSpPr>
+          <p:cNvPr id="17" name="Rak 16"/>
+          <p:cNvCxnSpPr>
+            <a:stCxn id="15" idx="2"/>
+            <a:endCxn id="57" idx="0"/>
+          </p:cNvCxnSpPr>
+          <p:nvPr/>
+        </p:nvCxnSpPr>
+        <p:spPr>
+          <a:xfrm>
+            <a:off x="3059832" y="1772816"/>
+            <a:ext cx="432048" cy="1152128"/>
+          </a:xfrm>
+          <a:prstGeom prst="line">
+            <a:avLst/>
+          </a:prstGeom>
+        </p:spPr>
+        <p:style>
+          <a:lnRef idx="2">
+            <a:schemeClr val="accent1"/>
+          </a:lnRef>
+          <a:fillRef idx="0">
+            <a:schemeClr val="accent1"/>
+          </a:fillRef>
+          <a:effectRef idx="1">
+            <a:schemeClr val="accent1"/>
+          </a:effectRef>
+          <a:fontRef idx="minor">
+            <a:schemeClr val="tx1"/>
+          </a:fontRef>
+        </p:style>
+      </p:cxnSp>
+      <p:cxnSp>
+        <p:nvCxnSpPr>
+          <p:cNvPr id="18" name="Rak 17"/>
+          <p:cNvCxnSpPr>
+            <a:stCxn id="57" idx="2"/>
+            <a:endCxn id="65" idx="3"/>
+          </p:cNvCxnSpPr>
+          <p:nvPr/>
+        </p:nvCxnSpPr>
+        <p:spPr>
+          <a:xfrm flipH="1">
+            <a:off x="3448832" y="3140968"/>
+            <a:ext cx="43048" cy="1332148"/>
+          </a:xfrm>
+          <a:prstGeom prst="line">
+            <a:avLst/>
+          </a:prstGeom>
+        </p:spPr>
+        <p:style>
+          <a:lnRef idx="2">
+            <a:schemeClr val="accent1"/>
+          </a:lnRef>
+          <a:fillRef idx="0">
+            <a:schemeClr val="accent1"/>
+          </a:fillRef>
+          <a:effectRef idx="1">
+            <a:schemeClr val="accent1"/>
+          </a:effectRef>
+          <a:fontRef idx="minor">
+            <a:schemeClr val="tx1"/>
+          </a:fontRef>
+        </p:style>
+      </p:cxnSp>
+      <p:sp>
+        <p:nvSpPr>
+          <p:cNvPr id="44" name="Rektangel 43"/>
+          <p:cNvSpPr/>
+          <p:nvPr/>
+        </p:nvSpPr>
+        <p:spPr>
+          <a:xfrm>
+            <a:off x="1187624" y="3429000"/>
+            <a:ext cx="3413336" cy="2646098"/>
+          </a:xfrm>
+          <a:prstGeom prst="rect">
+            <a:avLst/>
+          </a:prstGeom>
+          <a:noFill/>
+          <a:ln>
+            <a:prstDash val="dash"/>
+          </a:ln>
+          <a:effectLst/>
+        </p:spPr>
+        <p:style>
+          <a:lnRef idx="1">
+            <a:schemeClr val="accent1"/>
+          </a:lnRef>
+          <a:fillRef idx="3">
+            <a:schemeClr val="accent1"/>
+          </a:fillRef>
+          <a:effectRef idx="2">
+            <a:schemeClr val="accent1"/>
+          </a:effectRef>
+          <a:fontRef idx="minor">
+            <a:schemeClr val="lt1"/>
+          </a:fontRef>
+        </p:style>
+        <p:txBody>
+          <a:bodyPr rtlCol="0" anchor="ctr"/>
+          <a:lstStyle/>
+          <a:p>
+            <a:pPr algn="ctr"/>
+            <a:endParaRPr lang="en-GB"/>
+          </a:p>
+        </p:txBody>
+      </p:sp>
+      <p:cxnSp>
+        <p:nvCxnSpPr>
+          <p:cNvPr id="45" name="Rak 44"/>
+          <p:cNvCxnSpPr>
+            <a:stCxn id="12" idx="2"/>
+            <a:endCxn id="10" idx="0"/>
+          </p:cNvCxnSpPr>
+          <p:nvPr/>
+        </p:nvCxnSpPr>
+        <p:spPr>
+          <a:xfrm>
+            <a:off x="2476724" y="4653136"/>
+            <a:ext cx="0" cy="72008"/>
+          </a:xfrm>
+          <a:prstGeom prst="line">
+            <a:avLst/>
+          </a:prstGeom>
+        </p:spPr>
+        <p:style>
+          <a:lnRef idx="2">
+            <a:schemeClr val="accent1"/>
+          </a:lnRef>
+          <a:fillRef idx="0">
+            <a:schemeClr val="accent1"/>
+          </a:fillRef>
+          <a:effectRef idx="1">
+            <a:schemeClr val="accent1"/>
+          </a:effectRef>
+          <a:fontRef idx="minor">
+            <a:schemeClr val="tx1"/>
+          </a:fontRef>
+        </p:style>
+      </p:cxnSp>
+      <p:cxnSp>
+        <p:nvCxnSpPr>
+          <p:cNvPr id="48" name="Rak 47"/>
+          <p:cNvCxnSpPr>
+            <a:stCxn id="10" idx="2"/>
+            <a:endCxn id="5" idx="0"/>
+          </p:cNvCxnSpPr>
+          <p:nvPr/>
+        </p:nvCxnSpPr>
+        <p:spPr>
+          <a:xfrm flipH="1">
+            <a:off x="1828652" y="5301208"/>
+            <a:ext cx="648072" cy="144016"/>
+          </a:xfrm>
+          <a:prstGeom prst="line">
+            <a:avLst/>
+          </a:prstGeom>
+        </p:spPr>
+        <p:style>
+          <a:lnRef idx="2">
+            <a:schemeClr val="accent1"/>
+          </a:lnRef>
+          <a:fillRef idx="0">
+            <a:schemeClr val="accent1"/>
+          </a:fillRef>
+          <a:effectRef idx="1">
+            <a:schemeClr val="accent1"/>
+          </a:effectRef>
+          <a:fontRef idx="minor">
+            <a:schemeClr val="tx1"/>
+          </a:fontRef>
+        </p:style>
+      </p:cxnSp>
+      <p:cxnSp>
+        <p:nvCxnSpPr>
+          <p:cNvPr id="51" name="Rak 50"/>
+          <p:cNvCxnSpPr>
+            <a:stCxn id="10" idx="2"/>
+            <a:endCxn id="6" idx="0"/>
+          </p:cNvCxnSpPr>
+          <p:nvPr/>
+        </p:nvCxnSpPr>
+        <p:spPr>
+          <a:xfrm>
+            <a:off x="2476724" y="5301208"/>
+            <a:ext cx="648072" cy="144016"/>
+          </a:xfrm>
+          <a:prstGeom prst="line">
+            <a:avLst/>
+          </a:prstGeom>
+        </p:spPr>
+        <p:style>
+          <a:lnRef idx="2">
+            <a:schemeClr val="accent1"/>
+          </a:lnRef>
+          <a:fillRef idx="0">
+            <a:schemeClr val="accent1"/>
+          </a:fillRef>
+          <a:effectRef idx="1">
+            <a:schemeClr val="accent1"/>
+          </a:effectRef>
+          <a:fontRef idx="minor">
+            <a:schemeClr val="tx1"/>
+          </a:fontRef>
+        </p:style>
+      </p:cxnSp>
+      <p:sp>
+        <p:nvSpPr>
+          <p:cNvPr id="54" name="Rektangel 53"/>
+          <p:cNvSpPr/>
+          <p:nvPr/>
+        </p:nvSpPr>
+        <p:spPr>
+          <a:xfrm>
+            <a:off x="4672968" y="4250705"/>
+            <a:ext cx="360040" cy="288032"/>
+          </a:xfrm>
+          <a:prstGeom prst="rect">
+            <a:avLst/>
+          </a:prstGeom>
+          <a:noFill/>
+          <a:ln>
+            <a:prstDash val="dash"/>
+          </a:ln>
+          <a:effectLst/>
+        </p:spPr>
+        <p:style>
+          <a:lnRef idx="1">
+            <a:schemeClr val="accent1"/>
+          </a:lnRef>
+          <a:fillRef idx="3">
+            <a:schemeClr val="accent1"/>
+          </a:fillRef>
+          <a:effectRef idx="2">
+            <a:schemeClr val="accent1"/>
+          </a:effectRef>
+          <a:fontRef idx="minor">
+            <a:schemeClr val="lt1"/>
+          </a:fontRef>
+        </p:style>
+        <p:txBody>
+          <a:bodyPr rtlCol="0" anchor="ctr"/>
+          <a:lstStyle/>
+          <a:p>
+            <a:pPr algn="ctr"/>
+            <a:endParaRPr lang="en-GB"/>
+          </a:p>
+        </p:txBody>
+      </p:sp>
+      <p:sp>
+        <p:nvSpPr>
+          <p:cNvPr id="55" name="textruta 54"/>
+          <p:cNvSpPr txBox="1"/>
+          <p:nvPr/>
+        </p:nvSpPr>
+        <p:spPr>
+          <a:xfrm>
+            <a:off x="4961000" y="4221088"/>
+            <a:ext cx="1080120" cy="276999"/>
+          </a:xfrm>
+          <a:prstGeom prst="rect">
+            <a:avLst/>
+          </a:prstGeom>
+          <a:noFill/>
+        </p:spPr>
+        <p:txBody>
+          <a:bodyPr wrap="square" rtlCol="0">
+            <a:spAutoFit/>
+          </a:bodyPr>
+          <a:lstStyle/>
+          <a:p>
+            <a:r>
+              <a:rPr lang="en-GB" sz="1200" dirty="0" smtClean="0">
+                <a:latin typeface="Arial" pitchFamily="34" charset="0"/>
+                <a:cs typeface="Arial" pitchFamily="34" charset="0"/>
+              </a:rPr>
+              <a:t>= </a:t>
+            </a:r>
+            <a:r>
+              <a:rPr lang="en-GB" sz="1200" dirty="0" err="1" smtClean="0">
+                <a:latin typeface="Arial" pitchFamily="34" charset="0"/>
+                <a:cs typeface="Arial" pitchFamily="34" charset="0"/>
+              </a:rPr>
+              <a:t>Huvudman</a:t>
+            </a:r>
+            <a:endParaRPr lang="en-GB" sz="1200" dirty="0">
+              <a:latin typeface="Arial" pitchFamily="34" charset="0"/>
+              <a:cs typeface="Arial" pitchFamily="34" charset="0"/>
+            </a:endParaRPr>
+          </a:p>
+        </p:txBody>
+      </p:sp>
+      <p:sp>
+        <p:nvSpPr>
+          <p:cNvPr id="57" name="Rektangel 56"/>
+          <p:cNvSpPr/>
+          <p:nvPr/>
+        </p:nvSpPr>
+        <p:spPr>
+          <a:xfrm>
+            <a:off x="2555776" y="2924944"/>
+            <a:ext cx="1872208" cy="216024"/>
+          </a:xfrm>
+          <a:prstGeom prst="rect">
+            <a:avLst/>
+          </a:prstGeom>
+          <a:solidFill>
+            <a:srgbClr val="FFFFFF"/>
+          </a:solidFill>
+          <a:ln>
+            <a:solidFill>
+              <a:schemeClr val="tx1"/>
+            </a:solidFill>
+          </a:ln>
+          <a:effectLst/>
+        </p:spPr>
+        <p:style>
+          <a:lnRef idx="1">
+            <a:schemeClr val="accent1"/>
+          </a:lnRef>
+          <a:fillRef idx="3">
+            <a:schemeClr val="accent1"/>
+          </a:fillRef>
+          <a:effectRef idx="2">
+            <a:schemeClr val="accent1"/>
+          </a:effectRef>
+          <a:fontRef idx="minor">
+            <a:schemeClr val="lt1"/>
+          </a:fontRef>
+        </p:style>
+        <p:txBody>
+          <a:bodyPr rtlCol="0" anchor="ctr"/>
+          <a:lstStyle/>
+          <a:p>
+            <a:pPr algn="ctr"/>
+            <a:r>
+              <a:rPr lang="en-GB" sz="1400" dirty="0" err="1" smtClean="0">
+                <a:solidFill>
+                  <a:schemeClr val="tx1"/>
+                </a:solidFill>
+              </a:rPr>
+              <a:t>Virtuell</a:t>
+            </a:r>
+            <a:r>
+              <a:rPr lang="en-GB" sz="1400" dirty="0" smtClean="0">
+                <a:solidFill>
+                  <a:schemeClr val="tx1"/>
+                </a:solidFill>
+              </a:rPr>
+              <a:t> </a:t>
+            </a:r>
+            <a:r>
+              <a:rPr lang="en-GB" sz="1400" dirty="0" err="1" smtClean="0">
+                <a:solidFill>
+                  <a:schemeClr val="tx1"/>
+                </a:solidFill>
+              </a:rPr>
+              <a:t>tjänst</a:t>
+            </a:r>
+            <a:endParaRPr lang="en-GB" sz="1400" dirty="0">
+              <a:solidFill>
+                <a:schemeClr val="tx1"/>
+              </a:solidFill>
+            </a:endParaRPr>
+          </a:p>
+        </p:txBody>
+      </p:sp>
+      <p:sp>
+        <p:nvSpPr>
+          <p:cNvPr id="64" name="Rektangel 63"/>
+          <p:cNvSpPr/>
+          <p:nvPr/>
+        </p:nvSpPr>
+        <p:spPr>
+          <a:xfrm>
+            <a:off x="5076056" y="2924944"/>
+            <a:ext cx="1872208" cy="216024"/>
+          </a:xfrm>
+          <a:prstGeom prst="rect">
+            <a:avLst/>
+          </a:prstGeom>
+          <a:solidFill>
+            <a:schemeClr val="bg1">
+              <a:lumMod val="85000"/>
+            </a:schemeClr>
+          </a:solidFill>
+          <a:ln>
+            <a:solidFill>
+              <a:schemeClr val="tx1"/>
+            </a:solidFill>
+          </a:ln>
+          <a:effectLst/>
+        </p:spPr>
+        <p:style>
+          <a:lnRef idx="1">
+            <a:schemeClr val="accent1"/>
+          </a:lnRef>
+          <a:fillRef idx="3">
+            <a:schemeClr val="accent1"/>
+          </a:fillRef>
+          <a:effectRef idx="2">
+            <a:schemeClr val="accent1"/>
+          </a:effectRef>
+          <a:fontRef idx="minor">
+            <a:schemeClr val="lt1"/>
+          </a:fontRef>
+        </p:style>
+        <p:txBody>
+          <a:bodyPr rtlCol="0" anchor="ctr"/>
+          <a:lstStyle/>
+          <a:p>
+            <a:pPr algn="ctr"/>
+            <a:r>
+              <a:rPr lang="en-GB" sz="1400" dirty="0" err="1" smtClean="0">
+                <a:solidFill>
+                  <a:schemeClr val="tx1"/>
+                </a:solidFill>
+              </a:rPr>
+              <a:t>Tjänsteaddr.katalog</a:t>
+            </a:r>
+            <a:endParaRPr lang="en-GB" sz="1400" dirty="0">
+              <a:solidFill>
+                <a:schemeClr val="tx1"/>
+              </a:solidFill>
+            </a:endParaRPr>
+          </a:p>
+        </p:txBody>
+      </p:sp>
+      <p:sp>
+        <p:nvSpPr>
+          <p:cNvPr id="65" name="Rektangel 64"/>
+          <p:cNvSpPr/>
+          <p:nvPr/>
+        </p:nvSpPr>
+        <p:spPr>
+          <a:xfrm>
+            <a:off x="1576624" y="4365104"/>
+            <a:ext cx="1872208" cy="216024"/>
+          </a:xfrm>
+          <a:prstGeom prst="rect">
+            <a:avLst/>
+          </a:prstGeom>
+          <a:solidFill>
+            <a:srgbClr val="FFFFFF"/>
+          </a:solidFill>
+          <a:ln>
+            <a:solidFill>
+              <a:schemeClr val="tx1"/>
+            </a:solidFill>
+          </a:ln>
+          <a:effectLst/>
+        </p:spPr>
+        <p:style>
+          <a:lnRef idx="1">
+            <a:schemeClr val="accent1"/>
+          </a:lnRef>
+          <a:fillRef idx="3">
+            <a:schemeClr val="accent1"/>
+          </a:fillRef>
+          <a:effectRef idx="2">
+            <a:schemeClr val="accent1"/>
+          </a:effectRef>
+          <a:fontRef idx="minor">
+            <a:schemeClr val="lt1"/>
+          </a:fontRef>
+        </p:style>
+        <p:txBody>
+          <a:bodyPr rtlCol="0" anchor="ctr"/>
+          <a:lstStyle/>
+          <a:p>
+            <a:pPr algn="ctr"/>
+            <a:r>
+              <a:rPr lang="en-GB" sz="1400" dirty="0" err="1" smtClean="0">
+                <a:solidFill>
+                  <a:schemeClr val="tx1"/>
+                </a:solidFill>
+              </a:rPr>
+              <a:t>Virtuell</a:t>
+            </a:r>
+            <a:r>
+              <a:rPr lang="en-GB" sz="1400" dirty="0" smtClean="0">
+                <a:solidFill>
+                  <a:schemeClr val="tx1"/>
+                </a:solidFill>
+              </a:rPr>
+              <a:t> </a:t>
+            </a:r>
+            <a:r>
+              <a:rPr lang="en-GB" sz="1400" dirty="0" err="1" smtClean="0">
+                <a:solidFill>
+                  <a:schemeClr val="tx1"/>
+                </a:solidFill>
+              </a:rPr>
+              <a:t>tjänst</a:t>
+            </a:r>
+            <a:endParaRPr lang="en-GB" sz="1400" dirty="0">
+              <a:solidFill>
+                <a:schemeClr val="tx1"/>
+              </a:solidFill>
+            </a:endParaRPr>
+          </a:p>
+        </p:txBody>
+      </p:sp>
+      <p:cxnSp>
+        <p:nvCxnSpPr>
+          <p:cNvPr id="69" name="Rak 68"/>
+          <p:cNvCxnSpPr/>
+          <p:nvPr/>
+        </p:nvCxnSpPr>
+        <p:spPr>
+          <a:xfrm>
+            <a:off x="4427984" y="2996952"/>
+            <a:ext cx="648072" cy="0"/>
+          </a:xfrm>
+          <a:prstGeom prst="line">
+            <a:avLst/>
+          </a:prstGeom>
+          <a:ln>
+            <a:solidFill>
+              <a:srgbClr val="000000"/>
+            </a:solidFill>
+          </a:ln>
+        </p:spPr>
+        <p:style>
+          <a:lnRef idx="2">
+            <a:schemeClr val="accent1"/>
+          </a:lnRef>
+          <a:fillRef idx="0">
+            <a:schemeClr val="accent1"/>
+          </a:fillRef>
+          <a:effectRef idx="1">
+            <a:schemeClr val="accent1"/>
+          </a:effectRef>
+          <a:fontRef idx="minor">
+            <a:schemeClr val="tx1"/>
+          </a:fontRef>
+        </p:style>
+      </p:cxnSp>
+      <p:sp>
+        <p:nvSpPr>
+          <p:cNvPr id="70" name="Ellips 84"/>
+          <p:cNvSpPr>
+            <a:spLocks noChangeArrowheads="1"/>
+          </p:cNvSpPr>
+          <p:nvPr/>
+        </p:nvSpPr>
+        <p:spPr bwMode="auto">
+          <a:xfrm>
+            <a:off x="3448832" y="4365104"/>
+            <a:ext cx="279502" cy="271151"/>
+          </a:xfrm>
+          <a:prstGeom prst="ellipse">
+            <a:avLst/>
+          </a:prstGeom>
+          <a:solidFill>
+            <a:schemeClr val="accent6">
+              <a:lumMod val="60000"/>
+              <a:lumOff val="40000"/>
+            </a:schemeClr>
+          </a:solidFill>
+          <a:ln w="9525">
+            <a:solidFill>
+              <a:srgbClr val="003468"/>
+            </a:solidFill>
+            <a:round/>
+            <a:headEnd/>
+            <a:tailEnd/>
+          </a:ln>
+        </p:spPr>
+        <p:txBody>
+          <a:bodyPr wrap="none" lIns="63898" tIns="31949" rIns="63898" bIns="31949" anchor="ctr"/>
+          <a:lstStyle/>
+          <a:p>
+            <a:pPr algn="ctr" eaLnBrk="0" hangingPunct="0">
+              <a:spcBef>
+                <a:spcPct val="50000"/>
+              </a:spcBef>
+            </a:pPr>
+            <a:r>
+              <a:rPr lang="en-GB" sz="1000" b="1" dirty="0" smtClean="0">
+                <a:cs typeface="Geneva" charset="0"/>
+              </a:rPr>
+              <a:t>AP</a:t>
+            </a:r>
+            <a:endParaRPr lang="en-GB" sz="1000" b="1" dirty="0">
+              <a:cs typeface="Geneva" charset="0"/>
+            </a:endParaRPr>
+          </a:p>
+        </p:txBody>
+      </p:sp>
+      <p:sp>
+        <p:nvSpPr>
+          <p:cNvPr id="71" name="Ellips 84"/>
+          <p:cNvSpPr>
+            <a:spLocks noChangeArrowheads="1"/>
+          </p:cNvSpPr>
+          <p:nvPr/>
+        </p:nvSpPr>
+        <p:spPr bwMode="auto">
+          <a:xfrm>
+            <a:off x="2080680" y="5445224"/>
+            <a:ext cx="279502" cy="271151"/>
+          </a:xfrm>
+          <a:prstGeom prst="ellipse">
+            <a:avLst/>
+          </a:prstGeom>
+          <a:solidFill>
+            <a:schemeClr val="accent6">
+              <a:lumMod val="60000"/>
+              <a:lumOff val="40000"/>
+            </a:schemeClr>
+          </a:solidFill>
+          <a:ln w="9525">
+            <a:solidFill>
+              <a:srgbClr val="003468"/>
+            </a:solidFill>
+            <a:round/>
+            <a:headEnd/>
+            <a:tailEnd/>
+          </a:ln>
+        </p:spPr>
+        <p:txBody>
+          <a:bodyPr wrap="none" lIns="63898" tIns="31949" rIns="63898" bIns="31949" anchor="ctr"/>
+          <a:lstStyle/>
+          <a:p>
+            <a:pPr algn="ctr" eaLnBrk="0" hangingPunct="0">
+              <a:spcBef>
+                <a:spcPct val="50000"/>
+              </a:spcBef>
+            </a:pPr>
+            <a:r>
+              <a:rPr lang="en-GB" sz="1000" b="1" dirty="0" smtClean="0">
+                <a:cs typeface="Geneva" charset="0"/>
+              </a:rPr>
+              <a:t>KS</a:t>
+            </a:r>
+            <a:endParaRPr lang="en-GB" sz="1000" b="1" dirty="0">
+              <a:cs typeface="Geneva" charset="0"/>
+            </a:endParaRPr>
+          </a:p>
+        </p:txBody>
+      </p:sp>
+      <p:sp>
+        <p:nvSpPr>
+          <p:cNvPr id="74" name="Rektangel 73"/>
+          <p:cNvSpPr/>
+          <p:nvPr/>
+        </p:nvSpPr>
+        <p:spPr>
+          <a:xfrm>
+            <a:off x="4427984" y="1196752"/>
+            <a:ext cx="2448272" cy="576064"/>
+          </a:xfrm>
+          <a:prstGeom prst="rect">
+            <a:avLst/>
+          </a:prstGeom>
+        </p:spPr>
+        <p:style>
+          <a:lnRef idx="1">
+            <a:schemeClr val="accent1"/>
+          </a:lnRef>
+          <a:fillRef idx="3">
+            <a:schemeClr val="accent1"/>
+          </a:fillRef>
+          <a:effectRef idx="2">
+            <a:schemeClr val="accent1"/>
+          </a:effectRef>
+          <a:fontRef idx="minor">
+            <a:schemeClr val="lt1"/>
+          </a:fontRef>
+        </p:style>
+        <p:txBody>
+          <a:bodyPr rtlCol="0" anchor="ctr"/>
+          <a:lstStyle/>
+          <a:p>
+            <a:pPr algn="ctr"/>
+            <a:r>
+              <a:rPr lang="en-GB" sz="1400" dirty="0" err="1" smtClean="0"/>
+              <a:t>Nationell</a:t>
+            </a:r>
+            <a:r>
+              <a:rPr lang="en-GB" sz="1400" dirty="0" smtClean="0"/>
+              <a:t> </a:t>
+            </a:r>
+            <a:r>
+              <a:rPr lang="en-GB" sz="1400" dirty="0" err="1" smtClean="0"/>
+              <a:t>tjänstekonsument</a:t>
+            </a:r>
+            <a:endParaRPr lang="en-GB" sz="1400" dirty="0" smtClean="0"/>
+          </a:p>
+          <a:p>
+            <a:pPr algn="ctr"/>
+            <a:r>
+              <a:rPr lang="en-GB" sz="1400" dirty="0" err="1"/>
+              <a:t>f</a:t>
+            </a:r>
+            <a:r>
+              <a:rPr lang="en-GB" sz="1400" dirty="0" err="1" smtClean="0"/>
+              <a:t>ör</a:t>
+            </a:r>
+            <a:r>
+              <a:rPr lang="en-GB" sz="1400" dirty="0" smtClean="0"/>
+              <a:t> </a:t>
+            </a:r>
+            <a:r>
+              <a:rPr lang="en-GB" sz="1400" dirty="0" err="1" smtClean="0"/>
+              <a:t>medarbetare</a:t>
+            </a:r>
+            <a:endParaRPr lang="en-GB" sz="1400" dirty="0"/>
+          </a:p>
+        </p:txBody>
+      </p:sp>
+      <p:cxnSp>
+        <p:nvCxnSpPr>
+          <p:cNvPr id="75" name="Rak 74"/>
+          <p:cNvCxnSpPr>
+            <a:stCxn id="74" idx="2"/>
+            <a:endCxn id="57" idx="0"/>
+          </p:cNvCxnSpPr>
+          <p:nvPr/>
+        </p:nvCxnSpPr>
+        <p:spPr>
+          <a:xfrm flipH="1">
+            <a:off x="3491880" y="1772816"/>
+            <a:ext cx="2160240" cy="1152128"/>
+          </a:xfrm>
+          <a:prstGeom prst="line">
+            <a:avLst/>
+          </a:prstGeom>
+        </p:spPr>
+        <p:style>
+          <a:lnRef idx="2">
+            <a:schemeClr val="accent1"/>
+          </a:lnRef>
+          <a:fillRef idx="0">
+            <a:schemeClr val="accent1"/>
+          </a:fillRef>
+          <a:effectRef idx="1">
+            <a:schemeClr val="accent1"/>
+          </a:effectRef>
+          <a:fontRef idx="minor">
+            <a:schemeClr val="tx1"/>
+          </a:fontRef>
+        </p:style>
+      </p:cxnSp>
+      <p:sp>
+        <p:nvSpPr>
+          <p:cNvPr id="78" name="Ellips 84"/>
+          <p:cNvSpPr>
+            <a:spLocks noChangeArrowheads="1"/>
+          </p:cNvSpPr>
+          <p:nvPr/>
+        </p:nvSpPr>
+        <p:spPr bwMode="auto">
+          <a:xfrm>
+            <a:off x="3635896" y="1556792"/>
+            <a:ext cx="279502" cy="271151"/>
+          </a:xfrm>
+          <a:prstGeom prst="ellipse">
+            <a:avLst/>
+          </a:prstGeom>
+          <a:solidFill>
+            <a:schemeClr val="accent6">
+              <a:lumMod val="60000"/>
+              <a:lumOff val="40000"/>
+            </a:schemeClr>
+          </a:solidFill>
+          <a:ln w="9525">
+            <a:solidFill>
+              <a:srgbClr val="003468"/>
+            </a:solidFill>
+            <a:round/>
+            <a:headEnd/>
+            <a:tailEnd/>
+          </a:ln>
+        </p:spPr>
+        <p:txBody>
+          <a:bodyPr wrap="none" lIns="63898" tIns="31949" rIns="63898" bIns="31949" anchor="ctr"/>
+          <a:lstStyle/>
+          <a:p>
+            <a:pPr algn="ctr" eaLnBrk="0" hangingPunct="0">
+              <a:spcBef>
+                <a:spcPct val="50000"/>
+              </a:spcBef>
+            </a:pPr>
+            <a:r>
+              <a:rPr lang="en-GB" sz="1000" b="1" dirty="0" smtClean="0">
+                <a:cs typeface="Geneva" charset="0"/>
+              </a:rPr>
+              <a:t>K</a:t>
+            </a:r>
+            <a:endParaRPr lang="en-GB" sz="1000" b="1" dirty="0">
+              <a:cs typeface="Geneva" charset="0"/>
+            </a:endParaRPr>
+          </a:p>
+        </p:txBody>
+      </p:sp>
+      <p:sp>
+        <p:nvSpPr>
+          <p:cNvPr id="79" name="Ellips 84"/>
+          <p:cNvSpPr>
+            <a:spLocks noChangeArrowheads="1"/>
+          </p:cNvSpPr>
+          <p:nvPr/>
+        </p:nvSpPr>
+        <p:spPr bwMode="auto">
+          <a:xfrm>
+            <a:off x="6444208" y="1556792"/>
+            <a:ext cx="279502" cy="271151"/>
+          </a:xfrm>
+          <a:prstGeom prst="ellipse">
+            <a:avLst/>
+          </a:prstGeom>
+          <a:solidFill>
+            <a:schemeClr val="accent6">
+              <a:lumMod val="60000"/>
+              <a:lumOff val="40000"/>
+            </a:schemeClr>
+          </a:solidFill>
+          <a:ln w="9525">
+            <a:solidFill>
+              <a:srgbClr val="003468"/>
+            </a:solidFill>
+            <a:round/>
+            <a:headEnd/>
+            <a:tailEnd/>
+          </a:ln>
+        </p:spPr>
+        <p:txBody>
+          <a:bodyPr wrap="none" lIns="63898" tIns="31949" rIns="63898" bIns="31949" anchor="ctr"/>
+          <a:lstStyle/>
+          <a:p>
+            <a:pPr algn="ctr" eaLnBrk="0" hangingPunct="0">
+              <a:spcBef>
+                <a:spcPct val="50000"/>
+              </a:spcBef>
+            </a:pPr>
+            <a:r>
+              <a:rPr lang="en-GB" sz="1000" b="1" dirty="0" smtClean="0">
+                <a:cs typeface="Geneva" charset="0"/>
+              </a:rPr>
+              <a:t>K</a:t>
+            </a:r>
+            <a:endParaRPr lang="en-GB" sz="1000" b="1" dirty="0">
+              <a:cs typeface="Geneva" charset="0"/>
+            </a:endParaRPr>
+          </a:p>
+        </p:txBody>
+      </p:sp>
+      <p:sp>
+        <p:nvSpPr>
+          <p:cNvPr id="80" name="Ellips 84"/>
+          <p:cNvSpPr>
+            <a:spLocks noChangeArrowheads="1"/>
+          </p:cNvSpPr>
+          <p:nvPr/>
+        </p:nvSpPr>
+        <p:spPr bwMode="auto">
+          <a:xfrm>
+            <a:off x="2512728" y="4653136"/>
+            <a:ext cx="279502" cy="271151"/>
+          </a:xfrm>
+          <a:prstGeom prst="ellipse">
+            <a:avLst/>
+          </a:prstGeom>
+          <a:solidFill>
+            <a:schemeClr val="accent6">
+              <a:lumMod val="60000"/>
+              <a:lumOff val="40000"/>
+            </a:schemeClr>
+          </a:solidFill>
+          <a:ln w="9525">
+            <a:solidFill>
+              <a:srgbClr val="003468"/>
+            </a:solidFill>
+            <a:round/>
+            <a:headEnd/>
+            <a:tailEnd/>
+          </a:ln>
+        </p:spPr>
+        <p:txBody>
+          <a:bodyPr wrap="none" lIns="63898" tIns="31949" rIns="63898" bIns="31949" anchor="ctr"/>
+          <a:lstStyle/>
+          <a:p>
+            <a:pPr algn="ctr" eaLnBrk="0" hangingPunct="0">
+              <a:spcBef>
+                <a:spcPct val="50000"/>
+              </a:spcBef>
+            </a:pPr>
+            <a:r>
+              <a:rPr lang="en-GB" sz="1000" b="1" dirty="0">
+                <a:cs typeface="Geneva" charset="0"/>
+              </a:rPr>
+              <a:t>P</a:t>
+            </a:r>
+            <a:endParaRPr lang="en-GB" sz="1000" b="1" dirty="0" smtClean="0">
+              <a:cs typeface="Geneva" charset="0"/>
+            </a:endParaRPr>
+          </a:p>
+        </p:txBody>
+      </p:sp>
+      <p:sp>
+        <p:nvSpPr>
+          <p:cNvPr id="89" name="Ellips 84"/>
+          <p:cNvSpPr>
+            <a:spLocks noChangeArrowheads="1"/>
+          </p:cNvSpPr>
+          <p:nvPr/>
+        </p:nvSpPr>
+        <p:spPr bwMode="auto">
+          <a:xfrm>
+            <a:off x="3232808" y="5445224"/>
+            <a:ext cx="279502" cy="271151"/>
+          </a:xfrm>
+          <a:prstGeom prst="ellipse">
+            <a:avLst/>
+          </a:prstGeom>
+          <a:solidFill>
+            <a:schemeClr val="accent6">
+              <a:lumMod val="60000"/>
+              <a:lumOff val="40000"/>
+            </a:schemeClr>
+          </a:solidFill>
+          <a:ln w="9525">
+            <a:solidFill>
+              <a:srgbClr val="003468"/>
+            </a:solidFill>
+            <a:round/>
+            <a:headEnd/>
+            <a:tailEnd/>
+          </a:ln>
+        </p:spPr>
+        <p:txBody>
+          <a:bodyPr wrap="none" lIns="63898" tIns="31949" rIns="63898" bIns="31949" anchor="ctr"/>
+          <a:lstStyle/>
+          <a:p>
+            <a:pPr algn="ctr" eaLnBrk="0" hangingPunct="0">
+              <a:spcBef>
+                <a:spcPct val="50000"/>
+              </a:spcBef>
+            </a:pPr>
+            <a:r>
+              <a:rPr lang="en-GB" sz="1000" b="1" dirty="0" smtClean="0">
+                <a:cs typeface="Geneva" charset="0"/>
+              </a:rPr>
+              <a:t>KS</a:t>
+            </a:r>
+            <a:endParaRPr lang="en-GB" sz="1000" b="1" dirty="0">
+              <a:cs typeface="Geneva" charset="0"/>
+            </a:endParaRPr>
+          </a:p>
+        </p:txBody>
+      </p:sp>
+      <p:sp>
+        <p:nvSpPr>
+          <p:cNvPr id="16" name="Ellips 15"/>
+          <p:cNvSpPr/>
+          <p:nvPr/>
+        </p:nvSpPr>
+        <p:spPr>
+          <a:xfrm>
+            <a:off x="3275856" y="1916832"/>
+            <a:ext cx="1296144" cy="756664"/>
+          </a:xfrm>
+          <a:prstGeom prst="wedgeEllipseCallout">
+            <a:avLst/>
+          </a:prstGeom>
+          <a:solidFill>
+            <a:schemeClr val="bg1"/>
+          </a:solidFill>
+          <a:ln>
+            <a:solidFill>
+              <a:srgbClr val="000000"/>
+            </a:solidFill>
+          </a:ln>
+        </p:spPr>
+        <p:style>
+          <a:lnRef idx="1">
+            <a:schemeClr val="accent1"/>
+          </a:lnRef>
+          <a:fillRef idx="3">
+            <a:schemeClr val="accent1"/>
+          </a:fillRef>
+          <a:effectRef idx="2">
+            <a:schemeClr val="accent1"/>
+          </a:effectRef>
+          <a:fontRef idx="minor">
+            <a:schemeClr val="lt1"/>
+          </a:fontRef>
+        </p:style>
+        <p:txBody>
+          <a:bodyPr rtlCol="0" anchor="ctr"/>
+          <a:lstStyle/>
+          <a:p>
+            <a:pPr algn="ctr"/>
+            <a:r>
+              <a:rPr lang="en-GB" sz="1000" dirty="0" err="1" smtClean="0">
+                <a:solidFill>
+                  <a:srgbClr val="000000"/>
+                </a:solidFill>
+              </a:rPr>
+              <a:t>Adress</a:t>
+            </a:r>
+            <a:r>
+              <a:rPr lang="en-GB" sz="1000" dirty="0" smtClean="0">
+                <a:solidFill>
+                  <a:srgbClr val="000000"/>
+                </a:solidFill>
+              </a:rPr>
+              <a:t> = </a:t>
+            </a:r>
+            <a:r>
+              <a:rPr lang="en-GB" sz="1000" dirty="0" err="1" smtClean="0">
+                <a:solidFill>
+                  <a:srgbClr val="000000"/>
+                </a:solidFill>
+              </a:rPr>
+              <a:t>källsystemets</a:t>
+            </a:r>
+            <a:r>
+              <a:rPr lang="en-GB" sz="1000" dirty="0" smtClean="0">
+                <a:solidFill>
+                  <a:srgbClr val="000000"/>
+                </a:solidFill>
+              </a:rPr>
+              <a:t> </a:t>
+            </a:r>
+            <a:r>
+              <a:rPr lang="en-GB" sz="1000" dirty="0">
+                <a:solidFill>
+                  <a:srgbClr val="000000"/>
+                </a:solidFill>
+              </a:rPr>
+              <a:t>HSA-id (ex: “123”) </a:t>
+            </a:r>
+            <a:endParaRPr lang="en-GB" sz="1000" dirty="0">
+              <a:solidFill>
+                <a:srgbClr val="000000"/>
+              </a:solidFill>
+            </a:endParaRPr>
+          </a:p>
+        </p:txBody>
+      </p:sp>
+      <p:sp>
+        <p:nvSpPr>
+          <p:cNvPr id="62" name="Ellips 61"/>
+          <p:cNvSpPr/>
+          <p:nvPr/>
+        </p:nvSpPr>
+        <p:spPr>
+          <a:xfrm>
+            <a:off x="7236296" y="3068960"/>
+            <a:ext cx="1656184" cy="1116704"/>
+          </a:xfrm>
+          <a:prstGeom prst="wedgeEllipseCallout">
+            <a:avLst>
+              <a:gd name="adj1" fmla="val -76406"/>
+              <a:gd name="adj2" fmla="val -52278"/>
+            </a:avLst>
+          </a:prstGeom>
+          <a:solidFill>
+            <a:schemeClr val="bg1"/>
+          </a:solidFill>
+          <a:ln>
+            <a:solidFill>
+              <a:srgbClr val="000000"/>
+            </a:solidFill>
+          </a:ln>
+        </p:spPr>
+        <p:style>
+          <a:lnRef idx="1">
+            <a:schemeClr val="accent1"/>
+          </a:lnRef>
+          <a:fillRef idx="3">
+            <a:schemeClr val="accent1"/>
+          </a:fillRef>
+          <a:effectRef idx="2">
+            <a:schemeClr val="accent1"/>
+          </a:effectRef>
+          <a:fontRef idx="minor">
+            <a:schemeClr val="lt1"/>
+          </a:fontRef>
+        </p:style>
+        <p:txBody>
+          <a:bodyPr rtlCol="0" anchor="ctr"/>
+          <a:lstStyle/>
+          <a:p>
+            <a:pPr algn="ctr"/>
+            <a:r>
+              <a:rPr lang="en-GB" sz="1000" dirty="0" smtClean="0">
+                <a:solidFill>
+                  <a:srgbClr val="000000"/>
+                </a:solidFill>
+              </a:rPr>
+              <a:t>Info </a:t>
+            </a:r>
+            <a:r>
+              <a:rPr lang="en-GB" sz="1000" dirty="0" err="1" smtClean="0">
+                <a:solidFill>
+                  <a:srgbClr val="000000"/>
+                </a:solidFill>
+              </a:rPr>
+              <a:t>som</a:t>
+            </a:r>
+            <a:r>
+              <a:rPr lang="en-GB" sz="1000" dirty="0" smtClean="0">
+                <a:solidFill>
+                  <a:srgbClr val="000000"/>
+                </a:solidFill>
+              </a:rPr>
+              <a:t> </a:t>
+            </a:r>
+            <a:r>
+              <a:rPr lang="en-GB" sz="1000" dirty="0" err="1" smtClean="0">
+                <a:solidFill>
+                  <a:srgbClr val="000000"/>
+                </a:solidFill>
+              </a:rPr>
+              <a:t>kopplar</a:t>
+            </a:r>
+            <a:r>
+              <a:rPr lang="en-GB" sz="1000" dirty="0" smtClean="0">
+                <a:solidFill>
+                  <a:srgbClr val="000000"/>
+                </a:solidFill>
+              </a:rPr>
+              <a:t> </a:t>
+            </a:r>
+            <a:r>
+              <a:rPr lang="en-GB" sz="1000" dirty="0" err="1" smtClean="0">
+                <a:solidFill>
+                  <a:srgbClr val="000000"/>
+                </a:solidFill>
+              </a:rPr>
+              <a:t>källsystemets</a:t>
+            </a:r>
+            <a:r>
+              <a:rPr lang="en-GB" sz="1000" dirty="0" smtClean="0">
+                <a:solidFill>
+                  <a:srgbClr val="000000"/>
+                </a:solidFill>
+              </a:rPr>
+              <a:t> HSA-id till </a:t>
+            </a:r>
+            <a:r>
+              <a:rPr lang="en-GB" sz="1000" dirty="0" err="1" smtClean="0">
+                <a:solidFill>
+                  <a:srgbClr val="000000"/>
+                </a:solidFill>
+              </a:rPr>
+              <a:t>aktuell</a:t>
+            </a:r>
+            <a:r>
+              <a:rPr lang="en-GB" sz="1000" dirty="0" smtClean="0">
+                <a:solidFill>
+                  <a:srgbClr val="000000"/>
+                </a:solidFill>
+              </a:rPr>
+              <a:t> </a:t>
+            </a:r>
+            <a:r>
+              <a:rPr lang="en-GB" sz="1000" dirty="0" err="1" smtClean="0">
+                <a:solidFill>
+                  <a:srgbClr val="000000"/>
+                </a:solidFill>
+              </a:rPr>
+              <a:t>anslutningspunkt</a:t>
+            </a:r>
+            <a:endParaRPr lang="en-GB" sz="1000" dirty="0">
+              <a:solidFill>
+                <a:srgbClr val="000000"/>
+              </a:solidFill>
+            </a:endParaRPr>
+          </a:p>
+        </p:txBody>
+      </p:sp>
+      <p:sp>
+        <p:nvSpPr>
+          <p:cNvPr id="38" name="Ellips 37"/>
+          <p:cNvSpPr/>
+          <p:nvPr/>
+        </p:nvSpPr>
+        <p:spPr>
+          <a:xfrm>
+            <a:off x="3736864" y="3356992"/>
+            <a:ext cx="1267184" cy="792088"/>
+          </a:xfrm>
+          <a:prstGeom prst="wedgeEllipseCallout">
+            <a:avLst>
+              <a:gd name="adj1" fmla="val -69090"/>
+              <a:gd name="adj2" fmla="val 27368"/>
+            </a:avLst>
+          </a:prstGeom>
+          <a:solidFill>
+            <a:schemeClr val="bg1"/>
+          </a:solidFill>
+          <a:ln>
+            <a:solidFill>
+              <a:srgbClr val="000000"/>
+            </a:solidFill>
+          </a:ln>
+        </p:spPr>
+        <p:style>
+          <a:lnRef idx="1">
+            <a:schemeClr val="accent1"/>
+          </a:lnRef>
+          <a:fillRef idx="3">
+            <a:schemeClr val="accent1"/>
+          </a:fillRef>
+          <a:effectRef idx="2">
+            <a:schemeClr val="accent1"/>
+          </a:effectRef>
+          <a:fontRef idx="minor">
+            <a:schemeClr val="lt1"/>
+          </a:fontRef>
+        </p:style>
+        <p:txBody>
+          <a:bodyPr rtlCol="0" anchor="ctr"/>
+          <a:lstStyle/>
+          <a:p>
+            <a:pPr algn="ctr"/>
+            <a:r>
+              <a:rPr lang="en-GB" sz="1000" dirty="0" err="1" smtClean="0">
+                <a:solidFill>
+                  <a:srgbClr val="000000"/>
+                </a:solidFill>
+              </a:rPr>
+              <a:t>Adress</a:t>
+            </a:r>
+            <a:r>
+              <a:rPr lang="en-GB" sz="1000" dirty="0" smtClean="0">
+                <a:solidFill>
+                  <a:srgbClr val="000000"/>
+                </a:solidFill>
+              </a:rPr>
+              <a:t> = </a:t>
+            </a:r>
+            <a:r>
+              <a:rPr lang="en-GB" sz="1000" dirty="0" err="1" smtClean="0">
+                <a:solidFill>
+                  <a:srgbClr val="000000"/>
+                </a:solidFill>
+              </a:rPr>
+              <a:t>källsystemets</a:t>
+            </a:r>
+            <a:r>
+              <a:rPr lang="en-GB" sz="1000" dirty="0" smtClean="0">
+                <a:solidFill>
+                  <a:srgbClr val="000000"/>
+                </a:solidFill>
+              </a:rPr>
+              <a:t> HSA-id, </a:t>
+            </a:r>
+            <a:r>
+              <a:rPr lang="en-GB" sz="1000" dirty="0" err="1" smtClean="0">
+                <a:solidFill>
+                  <a:srgbClr val="000000"/>
+                </a:solidFill>
+              </a:rPr>
+              <a:t>t.ex</a:t>
+            </a:r>
+            <a:r>
+              <a:rPr lang="en-GB" sz="1000" dirty="0" smtClean="0">
+                <a:solidFill>
+                  <a:srgbClr val="000000"/>
+                </a:solidFill>
+              </a:rPr>
+              <a:t>. “KS123”</a:t>
+            </a:r>
+            <a:endParaRPr lang="en-GB" sz="1000" dirty="0">
+              <a:solidFill>
+                <a:srgbClr val="000000"/>
+              </a:solidFill>
+            </a:endParaRPr>
+          </a:p>
+        </p:txBody>
+      </p:sp>
+    </p:spTree>
+    <p:extLst>
+      <p:ext uri="{BB962C8B-B14F-4D97-AF65-F5344CB8AC3E}">
+        <p14:creationId xmlns:p14="http://schemas.microsoft.com/office/powerpoint/2010/main" val="158087979"/>
+      </p:ext>
+    </p:extLst>
+  </p:cSld>
+  <p:clrMapOvr>
+    <a:masterClrMapping/>
+  </p:clrMapOvr>
+  <p:timing>
+    <p:tnLst>
+      <p:par>
+        <p:cTn xmlns:p14="http://schemas.microsoft.com/office/powerpoint/2010/main" id="1" dur="indefinite" restart="never" nodeType="tmRoot"/>
+      </p:par>
+    </p:tnLst>
+  </p:timing>
+</p:sld>
+</file>
+
 <file path=ppt/slides/slide2.xml><?xml version="1.0" encoding="utf-8"?>
 <p:sld xmlns:a="http://schemas.openxmlformats.org/drawingml/2006/main" xmlns:r="http://schemas.openxmlformats.org/officeDocument/2006/relationships" xmlns:p="http://schemas.openxmlformats.org/presentationml/2006/main">
   <p:cSld>
@@ -11258,7 +12989,7 @@
             </a:r>
             <a:r>
               <a:rPr lang="en-GB" sz="800" dirty="0" err="1" smtClean="0"/>
-              <a:t>GetCareDocuments</a:t>
+              <a:t>GetCareDocumentation</a:t>
             </a:r>
             <a:r>
               <a:rPr lang="en-GB" sz="800" dirty="0" smtClean="0"/>
@@ -11313,7 +13044,7 @@
         <p:spPr bwMode="auto">
           <a:xfrm>
             <a:off x="4572000" y="3356992"/>
-            <a:ext cx="1440160" cy="432048"/>
+            <a:ext cx="2304256" cy="432048"/>
           </a:xfrm>
           <a:prstGeom prst="rect">
             <a:avLst/>
@@ -11501,6 +13232,42 @@
             <a:r>
               <a:rPr lang="en-GB" sz="800" dirty="0" err="1" smtClean="0"/>
               <a:t>vårdkontaker</a:t>
+            </a:r>
+            <a:r>
+              <a:rPr lang="en-GB" sz="800" dirty="0" smtClean="0"/>
+              <a:t> </a:t>
+            </a:r>
+            <a:r>
+              <a:rPr lang="en-GB" sz="800" dirty="0" err="1" smtClean="0"/>
+              <a:t>i</a:t>
+            </a:r>
+            <a:r>
+              <a:rPr lang="en-GB" sz="800" dirty="0" smtClean="0"/>
+              <a:t> </a:t>
+            </a:r>
+            <a:r>
+              <a:rPr lang="en-GB" sz="800" dirty="0" err="1" smtClean="0"/>
+              <a:t>valt</a:t>
+            </a:r>
+            <a:r>
+              <a:rPr lang="en-GB" sz="800" dirty="0" smtClean="0"/>
+              <a:t> </a:t>
+            </a:r>
+            <a:r>
+              <a:rPr lang="en-GB" sz="800" dirty="0" err="1" smtClean="0"/>
+              <a:t>källsystem</a:t>
+            </a:r>
+            <a:r>
+              <a:rPr lang="en-GB" sz="800" dirty="0" smtClean="0"/>
+              <a:t> (TK=</a:t>
+            </a:r>
+            <a:r>
+              <a:rPr lang="en-GB" sz="800" dirty="0" err="1" smtClean="0"/>
+              <a:t>GetCareDocumentation</a:t>
+            </a:r>
+            <a:r>
+              <a:rPr lang="en-GB" sz="800" dirty="0" smtClean="0"/>
+              <a:t>)</a:t>
             </a:r>
             <a:endParaRPr lang="en-GB" sz="800" dirty="0"/>
           </a:p>
@@ -11838,7 +13605,7 @@
             <a:fld id="{793AEFA7-59BA-446D-B708-A2D615D75329}" type="datetimeFigureOut">
               <a:rPr lang="sv-SE" smtClean="0"/>
               <a:pPr defTabSz="895350"/>
-              <a:t>2013-03-17</a:t>
+              <a:t>2013-04-08</a:t>
             </a:fld>
             <a:r>
               <a:rPr lang="sv-SE" smtClean="0"/>
@@ -14313,7 +16080,7 @@
             <a:fld id="{793AEFA7-59BA-446D-B708-A2D615D75329}" type="datetimeFigureOut">
               <a:rPr lang="sv-SE" smtClean="0"/>
               <a:pPr defTabSz="895350"/>
-              <a:t>2013-03-17</a:t>
+              <a:t>2013-04-08</a:t>
             </a:fld>
             <a:r>
               <a:rPr lang="sv-SE" smtClean="0"/>
@@ -16115,7 +17882,7 @@
             <a:fld id="{793AEFA7-59BA-446D-B708-A2D615D75329}" type="datetimeFigureOut">
               <a:rPr lang="sv-SE" smtClean="0"/>
               <a:pPr defTabSz="895350"/>
-              <a:t>2013-03-17</a:t>
+              <a:t>2013-04-08</a:t>
             </a:fld>
             <a:r>
               <a:rPr lang="sv-SE" smtClean="0"/>
@@ -18509,7 +20276,7 @@
             <a:fld id="{793AEFA7-59BA-446D-B708-A2D615D75329}" type="datetimeFigureOut">
               <a:rPr lang="sv-SE" smtClean="0"/>
               <a:pPr defTabSz="895350"/>
-              <a:t>2013-03-17</a:t>
+              <a:t>2013-04-08</a:t>
             </a:fld>
             <a:r>
               <a:rPr lang="sv-SE" smtClean="0"/>

</xml_diff>